<commit_message>
Live coding session 7 + PrimeTest uzdevums
</commit_message>
<xml_diff>
--- a/Java Homework 02 (eng).pptx
+++ b/Java Homework 02 (eng).pptx
@@ -6,7 +6,7 @@
     <p:sldMasterId id="2147483672" r:id="rId2"/>
   </p:sldMasterIdLst>
   <p:notesMasterIdLst>
-    <p:notesMasterId r:id="rId10"/>
+    <p:notesMasterId r:id="rId11"/>
   </p:notesMasterIdLst>
   <p:sldIdLst>
     <p:sldId id="256" r:id="rId3"/>
@@ -16,6 +16,7 @@
     <p:sldId id="260" r:id="rId7"/>
     <p:sldId id="261" r:id="rId8"/>
     <p:sldId id="262" r:id="rId9"/>
+    <p:sldId id="263" r:id="rId10"/>
   </p:sldIdLst>
   <p:sldSz cx="9144000" cy="5143500" type="screen16x9"/>
   <p:notesSz cx="6858000" cy="9144000"/>
@@ -1463,6 +1464,72 @@
         </p:txBody>
       </p:sp>
     </p:spTree>
+  </p:cSld>
+  <p:clrMapOvr>
+    <a:masterClrMapping/>
+  </p:clrMapOvr>
+</p:notes>
+</file>
+
+<file path=ppt/notesSlides/notesSlide7.xml><?xml version="1.0" encoding="utf-8"?>
+<p:notes xmlns:a="http://schemas.openxmlformats.org/drawingml/2006/main" xmlns:r="http://schemas.openxmlformats.org/officeDocument/2006/relationships" xmlns:p="http://schemas.openxmlformats.org/presentationml/2006/main">
+  <p:cSld>
+    <p:spTree>
+      <p:nvGrpSpPr>
+        <p:cNvPr id="1" name=""/>
+        <p:cNvGrpSpPr/>
+        <p:nvPr/>
+      </p:nvGrpSpPr>
+      <p:grpSpPr>
+        <a:xfrm>
+          <a:off x="0" y="0"/>
+          <a:ext cx="0" cy="0"/>
+          <a:chOff x="0" y="0"/>
+          <a:chExt cx="0" cy="0"/>
+        </a:xfrm>
+      </p:grpSpPr>
+      <p:sp>
+        <p:nvSpPr>
+          <p:cNvPr id="2" name="Образ слайда 1"/>
+          <p:cNvSpPr>
+            <a:spLocks noGrp="1" noRot="1" noChangeAspect="1"/>
+          </p:cNvSpPr>
+          <p:nvPr>
+            <p:ph type="sldImg"/>
+          </p:nvPr>
+        </p:nvSpPr>
+        <p:spPr>
+          <a:xfrm>
+            <a:off x="381000" y="685800"/>
+            <a:ext cx="6096000" cy="3429000"/>
+          </a:xfrm>
+        </p:spPr>
+      </p:sp>
+      <p:sp>
+        <p:nvSpPr>
+          <p:cNvPr id="3" name="Заметки 2"/>
+          <p:cNvSpPr>
+            <a:spLocks noGrp="1"/>
+          </p:cNvSpPr>
+          <p:nvPr>
+            <p:ph type="body" idx="1"/>
+          </p:nvPr>
+        </p:nvSpPr>
+        <p:spPr/>
+        <p:txBody>
+          <a:bodyPr/>
+          <a:lstStyle/>
+          <a:p>
+            <a:endParaRPr lang="en-US" dirty="0"/>
+          </a:p>
+        </p:txBody>
+      </p:sp>
+    </p:spTree>
+    <p:extLst>
+      <p:ext uri="{BB962C8B-B14F-4D97-AF65-F5344CB8AC3E}">
+        <p14:creationId xmlns:p14="http://schemas.microsoft.com/office/powerpoint/2010/main" val="476465171"/>
+      </p:ext>
+    </p:extLst>
   </p:cSld>
   <p:clrMapOvr>
     <a:masterClrMapping/>
@@ -27862,6 +27929,121 @@
     <p:extLst>
       <p:ext uri="{BB962C8B-B14F-4D97-AF65-F5344CB8AC3E}">
         <p14:creationId xmlns:p14="http://schemas.microsoft.com/office/powerpoint/2010/main" val="4102877884"/>
+      </p:ext>
+    </p:extLst>
+  </p:cSld>
+  <p:clrMapOvr>
+    <a:masterClrMapping/>
+  </p:clrMapOvr>
+</p:sld>
+</file>
+
+<file path=ppt/slides/slide8.xml><?xml version="1.0" encoding="utf-8"?>
+<p:sld xmlns:a="http://schemas.openxmlformats.org/drawingml/2006/main" xmlns:r="http://schemas.openxmlformats.org/officeDocument/2006/relationships" xmlns:p="http://schemas.openxmlformats.org/presentationml/2006/main">
+  <p:cSld>
+    <p:spTree>
+      <p:nvGrpSpPr>
+        <p:cNvPr id="1" name=""/>
+        <p:cNvGrpSpPr/>
+        <p:nvPr/>
+      </p:nvGrpSpPr>
+      <p:grpSpPr>
+        <a:xfrm>
+          <a:off x="0" y="0"/>
+          <a:ext cx="0" cy="0"/>
+          <a:chOff x="0" y="0"/>
+          <a:chExt cx="0" cy="0"/>
+        </a:xfrm>
+      </p:grpSpPr>
+      <p:sp>
+        <p:nvSpPr>
+          <p:cNvPr id="2" name="Заголовок 1">
+            <a:extLst>
+              <a:ext uri="{FF2B5EF4-FFF2-40B4-BE49-F238E27FC236}">
+                <a16:creationId xmlns:a16="http://schemas.microsoft.com/office/drawing/2014/main" id="{61F9C093-B26A-4457-986C-A69033CD1F51}"/>
+              </a:ext>
+            </a:extLst>
+          </p:cNvPr>
+          <p:cNvSpPr>
+            <a:spLocks noGrp="1"/>
+          </p:cNvSpPr>
+          <p:nvPr>
+            <p:ph type="title"/>
+          </p:nvPr>
+        </p:nvSpPr>
+        <p:spPr/>
+        <p:txBody>
+          <a:bodyPr/>
+          <a:lstStyle/>
+          <a:p>
+            <a:r>
+              <a:rPr lang="en-US" dirty="0"/>
+              <a:t>Java Task 11</a:t>
+            </a:r>
+          </a:p>
+        </p:txBody>
+      </p:sp>
+      <p:sp>
+        <p:nvSpPr>
+          <p:cNvPr id="3" name="Текст 2">
+            <a:extLst>
+              <a:ext uri="{FF2B5EF4-FFF2-40B4-BE49-F238E27FC236}">
+                <a16:creationId xmlns:a16="http://schemas.microsoft.com/office/drawing/2014/main" id="{4AFD2207-D069-43A4-8E92-9C9E4FFE68FD}"/>
+              </a:ext>
+            </a:extLst>
+          </p:cNvPr>
+          <p:cNvSpPr>
+            <a:spLocks noGrp="1"/>
+          </p:cNvSpPr>
+          <p:nvPr>
+            <p:ph type="body" idx="1"/>
+          </p:nvPr>
+        </p:nvSpPr>
+        <p:spPr/>
+        <p:txBody>
+          <a:bodyPr/>
+          <a:lstStyle/>
+          <a:p>
+            <a:endParaRPr lang="en-US" dirty="0"/>
+          </a:p>
+          <a:p>
+            <a:pPr marL="129899" indent="0">
+              <a:buNone/>
+            </a:pPr>
+            <a:r>
+              <a:rPr lang="en-US" dirty="0"/>
+              <a:t>Create class </a:t>
+            </a:r>
+            <a:r>
+              <a:rPr lang="en-US" dirty="0" err="1"/>
+              <a:t>PrimeTest</a:t>
+            </a:r>
+            <a:r>
+              <a:rPr lang="en-US" dirty="0"/>
+              <a:t>, that tells if entered (or defined) is prime number. Example : </a:t>
+            </a:r>
+          </a:p>
+          <a:p>
+            <a:pPr marL="129899" indent="0">
+              <a:buNone/>
+            </a:pPr>
+            <a:endParaRPr lang="en-US" dirty="0"/>
+          </a:p>
+          <a:p>
+            <a:pPr marL="129899" indent="0">
+              <a:buNone/>
+            </a:pPr>
+            <a:r>
+              <a:rPr lang="en-US" dirty="0"/>
+              <a:t>7 – is prime number; 24 – is not prime number </a:t>
+            </a:r>
+          </a:p>
+        </p:txBody>
+      </p:sp>
+    </p:spTree>
+    <p:extLst>
+      <p:ext uri="{BB962C8B-B14F-4D97-AF65-F5344CB8AC3E}">
+        <p14:creationId xmlns:p14="http://schemas.microsoft.com/office/powerpoint/2010/main" val="4236500470"/>
       </p:ext>
     </p:extLst>
   </p:cSld>

</xml_diff>

<commit_message>
Adjusted homework and added OOP basics presentation
</commit_message>
<xml_diff>
--- a/Java Homework 02 (eng).pptx
+++ b/Java Homework 02 (eng).pptx
@@ -24725,7 +24725,7 @@
               <a:buNone/>
             </a:pPr>
             <a:r>
-              <a:rPr lang="en" sz="1400">
+              <a:rPr lang="en" sz="1400" dirty="0">
                 <a:solidFill>
                   <a:srgbClr val="1C4587"/>
                 </a:solidFill>
@@ -24737,7 +24737,7 @@
               <a:t>Create class </a:t>
             </a:r>
             <a:r>
-              <a:rPr lang="en" sz="1400" b="1" i="1">
+              <a:rPr lang="en" sz="1400" b="1" i="1" dirty="0">
                 <a:solidFill>
                   <a:srgbClr val="1C4587"/>
                 </a:solidFill>
@@ -24749,7 +24749,7 @@
               <a:t>HelloUser</a:t>
             </a:r>
             <a:r>
-              <a:rPr lang="en" sz="1400">
+              <a:rPr lang="en" sz="1400" dirty="0">
                 <a:solidFill>
                   <a:srgbClr val="1C4587"/>
                 </a:solidFill>
@@ -24760,7 +24760,7 @@
               </a:rPr>
               <a:t>, which </a:t>
             </a:r>
-            <a:endParaRPr sz="1400">
+            <a:endParaRPr sz="1400" dirty="0">
               <a:solidFill>
                 <a:srgbClr val="1C4587"/>
               </a:solidFill>
@@ -24789,7 +24789,7 @@
               <a:buAutoNum type="arabicParenR"/>
             </a:pPr>
             <a:r>
-              <a:rPr lang="en" sz="1400">
+              <a:rPr lang="en" sz="1400" dirty="0">
                 <a:solidFill>
                   <a:srgbClr val="1C4587"/>
                 </a:solidFill>
@@ -24801,7 +24801,7 @@
               <a:t>Asks user for first name and last name in a </a:t>
             </a:r>
             <a:r>
-              <a:rPr lang="en" sz="1400" b="1">
+              <a:rPr lang="en" sz="1400" b="1" dirty="0">
                 <a:solidFill>
                   <a:srgbClr val="1C4587"/>
                 </a:solidFill>
@@ -24813,7 +24813,7 @@
               <a:t>single</a:t>
             </a:r>
             <a:r>
-              <a:rPr lang="en" sz="1400">
+              <a:rPr lang="en" sz="1400" dirty="0">
                 <a:solidFill>
                   <a:srgbClr val="1C4587"/>
                 </a:solidFill>
@@ -24824,7 +24824,7 @@
               </a:rPr>
               <a:t> line, separated by space</a:t>
             </a:r>
-            <a:endParaRPr sz="1400">
+            <a:endParaRPr sz="1400" dirty="0">
               <a:solidFill>
                 <a:srgbClr val="1C4587"/>
               </a:solidFill>
@@ -24853,7 +24853,7 @@
               <a:buAutoNum type="arabicParenR"/>
             </a:pPr>
             <a:r>
-              <a:rPr lang="en" sz="1400">
+              <a:rPr lang="en" sz="1400" dirty="0">
                 <a:solidFill>
                   <a:srgbClr val="1C4587"/>
                 </a:solidFill>
@@ -24864,7 +24864,7 @@
               </a:rPr>
               <a:t>Split first name and last name in two variables.</a:t>
             </a:r>
-            <a:endParaRPr sz="1400">
+            <a:endParaRPr sz="1400" dirty="0">
               <a:solidFill>
                 <a:srgbClr val="1C4587"/>
               </a:solidFill>
@@ -24893,7 +24893,7 @@
               <a:buAutoNum type="arabicParenR"/>
             </a:pPr>
             <a:r>
-              <a:rPr lang="en" sz="1400">
+              <a:rPr lang="en" sz="1400" dirty="0">
                 <a:solidFill>
                   <a:srgbClr val="1C4587"/>
                 </a:solidFill>
@@ -24904,7 +24904,7 @@
               </a:rPr>
               <a:t>Modify first name to start with capital letter, followed by all small letters</a:t>
             </a:r>
-            <a:endParaRPr sz="1400">
+            <a:endParaRPr sz="1400" dirty="0">
               <a:solidFill>
                 <a:srgbClr val="1C4587"/>
               </a:solidFill>
@@ -24933,7 +24933,7 @@
               <a:buAutoNum type="arabicParenR"/>
             </a:pPr>
             <a:r>
-              <a:rPr lang="en" sz="1400">
+              <a:rPr lang="en" sz="1400" dirty="0">
                 <a:solidFill>
                   <a:srgbClr val="1C4587"/>
                 </a:solidFill>
@@ -24944,7 +24944,7 @@
               </a:rPr>
               <a:t>Modify last name to be in uppercase</a:t>
             </a:r>
-            <a:endParaRPr sz="1400">
+            <a:endParaRPr sz="1400" dirty="0">
               <a:solidFill>
                 <a:srgbClr val="1C4587"/>
               </a:solidFill>
@@ -24973,7 +24973,7 @@
               <a:buAutoNum type="arabicParenR"/>
             </a:pPr>
             <a:r>
-              <a:rPr lang="en" sz="1400">
+              <a:rPr lang="en" sz="1400" dirty="0">
                 <a:solidFill>
                   <a:srgbClr val="1C4587"/>
                 </a:solidFill>
@@ -24984,7 +24984,7 @@
               </a:rPr>
               <a:t>Print name and surname to console in single quotes(') separated by single space</a:t>
             </a:r>
-            <a:endParaRPr sz="1400">
+            <a:endParaRPr sz="1400" dirty="0">
               <a:solidFill>
                 <a:srgbClr val="1C4587"/>
               </a:solidFill>
@@ -25008,7 +25008,7 @@
               <a:buNone/>
             </a:pPr>
             <a:r>
-              <a:rPr lang="en" sz="1400">
+              <a:rPr lang="en" sz="1400" dirty="0">
                 <a:solidFill>
                   <a:srgbClr val="1C4587"/>
                 </a:solidFill>
@@ -25019,7 +25019,7 @@
               </a:rPr>
               <a:t>e.g. ‘joHn LeMOn’ -&gt; 'John LEMON'</a:t>
             </a:r>
-            <a:endParaRPr sz="1400">
+            <a:endParaRPr sz="1400" dirty="0">
               <a:solidFill>
                 <a:srgbClr val="1C4587"/>
               </a:solidFill>
@@ -25042,7 +25042,7 @@
               </a:spcAft>
               <a:buNone/>
             </a:pPr>
-            <a:endParaRPr sz="1400">
+            <a:endParaRPr sz="1400" dirty="0">
               <a:solidFill>
                 <a:srgbClr val="1C4587"/>
               </a:solidFill>
@@ -25066,7 +25066,7 @@
               <a:buNone/>
             </a:pPr>
             <a:r>
-              <a:rPr lang="en" sz="1400" i="1">
+              <a:rPr lang="en" sz="1400" i="1" dirty="0">
                 <a:solidFill>
                   <a:srgbClr val="1C4587"/>
                 </a:solidFill>
@@ -25078,7 +25078,7 @@
               <a:t>Bonus:</a:t>
             </a:r>
             <a:r>
-              <a:rPr lang="en" sz="1400">
+              <a:rPr lang="en" sz="1400" dirty="0">
                 <a:solidFill>
                   <a:srgbClr val="1C4587"/>
                 </a:solidFill>
@@ -25089,7 +25089,7 @@
               </a:rPr>
               <a:t> </a:t>
             </a:r>
-            <a:endParaRPr sz="1400">
+            <a:endParaRPr sz="1400" dirty="0">
               <a:solidFill>
                 <a:srgbClr val="1C4587"/>
               </a:solidFill>
@@ -25118,7 +25118,7 @@
               <a:buAutoNum type="arabicParenR"/>
             </a:pPr>
             <a:r>
-              <a:rPr lang="en" sz="1400">
+              <a:rPr lang="en" sz="1400" dirty="0">
                 <a:solidFill>
                   <a:srgbClr val="1C4587"/>
                 </a:solidFill>
@@ -25127,9 +25127,9 @@
                 <a:cs typeface="Arial"/>
                 <a:sym typeface="Arial"/>
               </a:rPr>
-              <a:t>Add handling for leading/trailing spaces, several spaces between first name and last</a:t>
+              <a:t>Add handling for leading/trailing spaces</a:t>
             </a:r>
-            <a:endParaRPr sz="1400">
+            <a:endParaRPr sz="1400" dirty="0">
               <a:solidFill>
                 <a:srgbClr val="1C4587"/>
               </a:solidFill>
@@ -25158,7 +25158,7 @@
               <a:buAutoNum type="arabicParenR"/>
             </a:pPr>
             <a:r>
-              <a:rPr lang="en" sz="1400">
+              <a:rPr lang="en" sz="1400" dirty="0">
                 <a:solidFill>
                   <a:srgbClr val="1C4587"/>
                 </a:solidFill>
@@ -25169,7 +25169,7 @@
               </a:rPr>
               <a:t>Add handling for 2 last names. In this case use dash as separator when printing them out.</a:t>
             </a:r>
-            <a:endParaRPr sz="1400">
+            <a:endParaRPr sz="1400" dirty="0">
               <a:solidFill>
                 <a:srgbClr val="1C4587"/>
               </a:solidFill>
@@ -25198,7 +25198,7 @@
               <a:buAutoNum type="arabicParenR"/>
             </a:pPr>
             <a:r>
-              <a:rPr lang="en" sz="1400">
+              <a:rPr lang="en" sz="1400" dirty="0">
                 <a:solidFill>
                   <a:srgbClr val="1C4587"/>
                 </a:solidFill>
@@ -25209,7 +25209,7 @@
               </a:rPr>
               <a:t>Error handling. I.e. if user enters just one string(consider it as first name)</a:t>
             </a:r>
-            <a:endParaRPr sz="1400">
+            <a:endParaRPr sz="1400" dirty="0">
               <a:solidFill>
                 <a:srgbClr val="1C4587"/>
               </a:solidFill>
@@ -25238,7 +25238,7 @@
               <a:buAutoNum type="arabicParenR"/>
             </a:pPr>
             <a:r>
-              <a:rPr lang="en" sz="1400">
+              <a:rPr lang="en" sz="1400" dirty="0">
                 <a:solidFill>
                   <a:srgbClr val="1C4587"/>
                 </a:solidFill>
@@ -25249,7 +25249,7 @@
               </a:rPr>
               <a:t>Add handling for 2 and more last names(cycle needed here)</a:t>
             </a:r>
-            <a:endParaRPr sz="1400">
+            <a:endParaRPr sz="1400" dirty="0">
               <a:solidFill>
                 <a:srgbClr val="1C4587"/>
               </a:solidFill>
@@ -25273,7 +25273,7 @@
               <a:buNone/>
             </a:pPr>
             <a:r>
-              <a:rPr lang="en" sz="1400">
+              <a:rPr lang="en" sz="1400" dirty="0">
                 <a:solidFill>
                   <a:srgbClr val="1C4587"/>
                 </a:solidFill>
@@ -25284,7 +25284,7 @@
               </a:rPr>
               <a:t>e.g. ‘   jOhN lemOn      HooK   ’ -&gt; ‘John LEMON-HOOK’</a:t>
             </a:r>
-            <a:endParaRPr sz="1400">
+            <a:endParaRPr sz="1400" dirty="0">
               <a:solidFill>
                 <a:srgbClr val="1C4587"/>
               </a:solidFill>
@@ -26471,7 +26471,7 @@
                 <a:cs typeface="Arial"/>
                 <a:sym typeface="Arial"/>
               </a:rPr>
-              <a:t>(10); </a:t>
+              <a:t>(10) + 1; </a:t>
             </a:r>
             <a:r>
               <a:rPr lang="en-US" sz="1400" dirty="0">
@@ -27469,10 +27469,10 @@
                 <a:cs typeface="Arial"/>
                 <a:sym typeface="Arial"/>
               </a:rPr>
-              <a:t>Asks user how many primes to generate(starting from 2 and up) - limit the input to </a:t>
+              <a:t>Asks user how many primes to generate(starting from 2 and </a:t>
             </a:r>
             <a:r>
-              <a:rPr lang="lv-LV" sz="1400" dirty="0">
+              <a:rPr lang="en" sz="1400">
                 <a:solidFill>
                   <a:srgbClr val="1C4587"/>
                 </a:solidFill>
@@ -27481,7 +27481,7 @@
                 <a:cs typeface="Arial"/>
                 <a:sym typeface="Arial"/>
               </a:rPr>
-              <a:t>20</a:t>
+              <a:t>up)</a:t>
             </a:r>
             <a:endParaRPr sz="1400" dirty="0">
               <a:solidFill>

</xml_diff>

<commit_message>
String & own-made collections + adjusted homework file
</commit_message>
<xml_diff>
--- a/Java Homework 02 (eng).pptx
+++ b/Java Homework 02 (eng).pptx
@@ -6,7 +6,7 @@
     <p:sldMasterId id="2147483672" r:id="rId2"/>
   </p:sldMasterIdLst>
   <p:notesMasterIdLst>
-    <p:notesMasterId r:id="rId12"/>
+    <p:notesMasterId r:id="rId13"/>
   </p:notesMasterIdLst>
   <p:sldIdLst>
     <p:sldId id="256" r:id="rId3"/>
@@ -17,7 +17,8 @@
     <p:sldId id="261" r:id="rId8"/>
     <p:sldId id="262" r:id="rId9"/>
     <p:sldId id="263" r:id="rId10"/>
-    <p:sldId id="264" r:id="rId11"/>
+    <p:sldId id="265" r:id="rId11"/>
+    <p:sldId id="264" r:id="rId12"/>
   </p:sldIdLst>
   <p:sldSz cx="9144000" cy="5143500" type="screen16x9"/>
   <p:notesSz cx="6858000" cy="9144000"/>
@@ -24595,6 +24596,275 @@
 </p:sld>
 </file>
 
+<file path=ppt/slides/slide10.xml><?xml version="1.0" encoding="utf-8"?>
+<p:sld xmlns:a="http://schemas.openxmlformats.org/drawingml/2006/main" xmlns:r="http://schemas.openxmlformats.org/officeDocument/2006/relationships" xmlns:p="http://schemas.openxmlformats.org/presentationml/2006/main">
+  <p:cSld>
+    <p:spTree>
+      <p:nvGrpSpPr>
+        <p:cNvPr id="1" name=""/>
+        <p:cNvGrpSpPr/>
+        <p:nvPr/>
+      </p:nvGrpSpPr>
+      <p:grpSpPr>
+        <a:xfrm>
+          <a:off x="0" y="0"/>
+          <a:ext cx="0" cy="0"/>
+          <a:chOff x="0" y="0"/>
+          <a:chExt cx="0" cy="0"/>
+        </a:xfrm>
+      </p:grpSpPr>
+      <p:sp>
+        <p:nvSpPr>
+          <p:cNvPr id="2" name="Заголовок 1">
+            <a:extLst>
+              <a:ext uri="{FF2B5EF4-FFF2-40B4-BE49-F238E27FC236}">
+                <a16:creationId xmlns:a16="http://schemas.microsoft.com/office/drawing/2014/main" id="{7D3E18F8-6E71-4622-80C2-130AEBC9080D}"/>
+              </a:ext>
+            </a:extLst>
+          </p:cNvPr>
+          <p:cNvSpPr>
+            <a:spLocks noGrp="1"/>
+          </p:cNvSpPr>
+          <p:nvPr>
+            <p:ph type="title"/>
+          </p:nvPr>
+        </p:nvSpPr>
+        <p:spPr>
+          <a:xfrm>
+            <a:off x="311700" y="445025"/>
+            <a:ext cx="8520600" cy="572700"/>
+          </a:xfrm>
+        </p:spPr>
+        <p:txBody>
+          <a:bodyPr/>
+          <a:lstStyle/>
+          <a:p>
+            <a:r>
+              <a:rPr lang="en-US" dirty="0"/>
+              <a:t>Extra Achievement : Array Master</a:t>
+            </a:r>
+          </a:p>
+        </p:txBody>
+      </p:sp>
+      <p:sp>
+        <p:nvSpPr>
+          <p:cNvPr id="3" name="Текст 2">
+            <a:extLst>
+              <a:ext uri="{FF2B5EF4-FFF2-40B4-BE49-F238E27FC236}">
+                <a16:creationId xmlns:a16="http://schemas.microsoft.com/office/drawing/2014/main" id="{726E2948-8D0B-439E-AE05-4D30FA8D8E60}"/>
+              </a:ext>
+            </a:extLst>
+          </p:cNvPr>
+          <p:cNvSpPr>
+            <a:spLocks noGrp="1"/>
+          </p:cNvSpPr>
+          <p:nvPr>
+            <p:ph type="body" idx="1"/>
+          </p:nvPr>
+        </p:nvSpPr>
+        <p:spPr>
+          <a:xfrm>
+            <a:off x="311700" y="1152475"/>
+            <a:ext cx="8520600" cy="3674706"/>
+          </a:xfrm>
+        </p:spPr>
+        <p:txBody>
+          <a:bodyPr/>
+          <a:lstStyle/>
+          <a:p>
+            <a:endParaRPr lang="en-US" dirty="0"/>
+          </a:p>
+          <a:p>
+            <a:pPr marL="129899" indent="0">
+              <a:buNone/>
+            </a:pPr>
+            <a:r>
+              <a:rPr lang="en-US" dirty="0"/>
+              <a:t>Create class Spiral, that takes user input of 2 natural numbers (n and m), both strictly below 10, and generates matrix (2d array) of size n x m (respectively horizonal and vertical sizes). Contents of matrix should consist of sequential numbers from 0 to ((n * m) – 1), aligned in “spiral”. Example for 5 x 5 matrix :</a:t>
+            </a:r>
+            <a:endParaRPr lang="lv-LV" dirty="0"/>
+          </a:p>
+          <a:p>
+            <a:pPr marL="129899" indent="0">
+              <a:buNone/>
+            </a:pPr>
+            <a:endParaRPr lang="lv-LV" dirty="0"/>
+          </a:p>
+          <a:p>
+            <a:pPr marL="129899" indent="0">
+              <a:buNone/>
+            </a:pPr>
+            <a:r>
+              <a:rPr lang="en-US" dirty="0"/>
+              <a:t> </a:t>
+            </a:r>
+            <a:r>
+              <a:rPr lang="lv-LV" dirty="0"/>
+              <a:t> </a:t>
+            </a:r>
+            <a:r>
+              <a:rPr lang="en-US" dirty="0"/>
+              <a:t>0  </a:t>
+            </a:r>
+            <a:r>
+              <a:rPr lang="lv-LV" dirty="0"/>
+              <a:t> </a:t>
+            </a:r>
+            <a:r>
+              <a:rPr lang="en-US" dirty="0"/>
+              <a:t>1  </a:t>
+            </a:r>
+            <a:r>
+              <a:rPr lang="lv-LV" dirty="0"/>
+              <a:t>  </a:t>
+            </a:r>
+            <a:r>
+              <a:rPr lang="en-US" dirty="0"/>
+              <a:t>2  </a:t>
+            </a:r>
+            <a:r>
+              <a:rPr lang="lv-LV" dirty="0"/>
+              <a:t> </a:t>
+            </a:r>
+            <a:r>
+              <a:rPr lang="en-US" dirty="0"/>
+              <a:t>3  4 </a:t>
+            </a:r>
+          </a:p>
+          <a:p>
+            <a:pPr marL="129899" indent="0">
+              <a:buNone/>
+            </a:pPr>
+            <a:r>
+              <a:rPr lang="en-US" dirty="0"/>
+              <a:t>15 16 17 18  5 </a:t>
+            </a:r>
+          </a:p>
+          <a:p>
+            <a:pPr marL="129899" indent="0">
+              <a:buNone/>
+            </a:pPr>
+            <a:r>
+              <a:rPr lang="en-US" dirty="0"/>
+              <a:t>14 23 24 19  6 </a:t>
+            </a:r>
+          </a:p>
+          <a:p>
+            <a:pPr marL="129899" indent="0">
+              <a:buNone/>
+            </a:pPr>
+            <a:r>
+              <a:rPr lang="en-US" dirty="0"/>
+              <a:t>13 22 21 20  7 </a:t>
+            </a:r>
+          </a:p>
+          <a:p>
+            <a:pPr marL="129899" indent="0">
+              <a:buNone/>
+            </a:pPr>
+            <a:r>
+              <a:rPr lang="en-US" dirty="0"/>
+              <a:t>12 11 10  9  </a:t>
+            </a:r>
+            <a:r>
+              <a:rPr lang="lv-LV" dirty="0"/>
+              <a:t> </a:t>
+            </a:r>
+            <a:r>
+              <a:rPr lang="en-US" dirty="0"/>
+              <a:t>8</a:t>
+            </a:r>
+            <a:endParaRPr lang="lv-LV" dirty="0"/>
+          </a:p>
+          <a:p>
+            <a:pPr marL="129899" indent="0">
+              <a:buNone/>
+            </a:pPr>
+            <a:endParaRPr lang="lv-LV" dirty="0"/>
+          </a:p>
+          <a:p>
+            <a:pPr marL="129899" indent="0">
+              <a:buNone/>
+            </a:pPr>
+            <a:endParaRPr lang="lv-LV" dirty="0"/>
+          </a:p>
+          <a:p>
+            <a:pPr marL="129899" indent="0">
+              <a:buNone/>
+            </a:pPr>
+            <a:endParaRPr lang="lv-LV" dirty="0"/>
+          </a:p>
+          <a:p>
+            <a:pPr marL="129899" indent="0">
+              <a:buNone/>
+            </a:pPr>
+            <a:r>
+              <a:rPr lang="lv-LV" i="1" dirty="0"/>
+              <a:t>Hint</a:t>
+            </a:r>
+            <a:r>
+              <a:rPr lang="lv-LV" dirty="0"/>
+              <a:t> : for rounding up a floating numer, e.g. 2.5 -&gt; 3, use </a:t>
+            </a:r>
+            <a:r>
+              <a:rPr lang="lv-LV" b="1" dirty="0"/>
+              <a:t>Math.ceil(</a:t>
+            </a:r>
+            <a:r>
+              <a:rPr lang="lv-LV" dirty="0"/>
+              <a:t> 2.5 </a:t>
+            </a:r>
+            <a:r>
+              <a:rPr lang="lv-LV" b="1" dirty="0"/>
+              <a:t>)</a:t>
+            </a:r>
+            <a:endParaRPr lang="en-US" b="1" dirty="0"/>
+          </a:p>
+        </p:txBody>
+      </p:sp>
+      <p:pic>
+        <p:nvPicPr>
+          <p:cNvPr id="5" name="Рисунок 4">
+            <a:extLst>
+              <a:ext uri="{FF2B5EF4-FFF2-40B4-BE49-F238E27FC236}">
+                <a16:creationId xmlns:a16="http://schemas.microsoft.com/office/drawing/2014/main" id="{4A35BD3B-1692-4801-8E25-C26F6D1D9D8C}"/>
+              </a:ext>
+            </a:extLst>
+          </p:cNvPr>
+          <p:cNvPicPr>
+            <a:picLocks noChangeAspect="1"/>
+          </p:cNvPicPr>
+          <p:nvPr/>
+        </p:nvPicPr>
+        <p:blipFill>
+          <a:blip r:embed="rId2"/>
+          <a:stretch>
+            <a:fillRect/>
+          </a:stretch>
+        </p:blipFill>
+        <p:spPr>
+          <a:xfrm>
+            <a:off x="2182607" y="2374709"/>
+            <a:ext cx="1844200" cy="1684166"/>
+          </a:xfrm>
+          <a:prstGeom prst="rect">
+            <a:avLst/>
+          </a:prstGeom>
+        </p:spPr>
+      </p:pic>
+    </p:spTree>
+    <p:extLst>
+      <p:ext uri="{BB962C8B-B14F-4D97-AF65-F5344CB8AC3E}">
+        <p14:creationId xmlns:p14="http://schemas.microsoft.com/office/powerpoint/2010/main" val="2266669232"/>
+      </p:ext>
+    </p:extLst>
+  </p:cSld>
+  <p:clrMapOvr>
+    <a:masterClrMapping/>
+  </p:clrMapOvr>
+</p:sld>
+</file>
+
 <file path=ppt/slides/slide2.xml><?xml version="1.0" encoding="utf-8"?>
 <p:sld xmlns:a="http://schemas.openxmlformats.org/drawingml/2006/main" xmlns:r="http://schemas.openxmlformats.org/officeDocument/2006/relationships" xmlns:p="http://schemas.openxmlformats.org/presentationml/2006/main">
   <p:cSld>
@@ -28259,7 +28529,7 @@
           <p:cNvPr id="2" name="Заголовок 1">
             <a:extLst>
               <a:ext uri="{FF2B5EF4-FFF2-40B4-BE49-F238E27FC236}">
-                <a16:creationId xmlns:a16="http://schemas.microsoft.com/office/drawing/2014/main" id="{7D3E18F8-6E71-4622-80C2-130AEBC9080D}"/>
+                <a16:creationId xmlns:a16="http://schemas.microsoft.com/office/drawing/2014/main" id="{0989E1C1-9B37-463C-9040-167BBD617FC2}"/>
               </a:ext>
             </a:extLst>
           </p:cNvPr>
@@ -28270,19 +28540,14 @@
             <p:ph type="title"/>
           </p:nvPr>
         </p:nvSpPr>
-        <p:spPr>
-          <a:xfrm>
-            <a:off x="311700" y="445025"/>
-            <a:ext cx="8520600" cy="572700"/>
-          </a:xfrm>
-        </p:spPr>
+        <p:spPr/>
         <p:txBody>
           <a:bodyPr/>
           <a:lstStyle/>
           <a:p>
             <a:r>
               <a:rPr lang="en-US" dirty="0"/>
-              <a:t>Extra Achievement : Array Master</a:t>
+              <a:t>Java Task 12</a:t>
             </a:r>
           </a:p>
         </p:txBody>
@@ -28292,7 +28557,7 @@
           <p:cNvPr id="3" name="Текст 2">
             <a:extLst>
               <a:ext uri="{FF2B5EF4-FFF2-40B4-BE49-F238E27FC236}">
-                <a16:creationId xmlns:a16="http://schemas.microsoft.com/office/drawing/2014/main" id="{726E2948-8D0B-439E-AE05-4D30FA8D8E60}"/>
+                <a16:creationId xmlns:a16="http://schemas.microsoft.com/office/drawing/2014/main" id="{1D21C1B9-9050-4AD3-AFD1-5FF8B5D4F2E5}"/>
               </a:ext>
             </a:extLst>
           </p:cNvPr>
@@ -28303,12 +28568,7 @@
             <p:ph type="body" idx="1"/>
           </p:nvPr>
         </p:nvSpPr>
-        <p:spPr>
-          <a:xfrm>
-            <a:off x="311700" y="1152475"/>
-            <a:ext cx="8520600" cy="3674706"/>
-          </a:xfrm>
-        </p:spPr>
+        <p:spPr/>
         <p:txBody>
           <a:bodyPr/>
           <a:lstStyle/>
@@ -28321,182 +28581,185 @@
             </a:pPr>
             <a:r>
               <a:rPr lang="en-US" dirty="0"/>
-              <a:t>Create class Spiral, that takes user input of 2 natural numbers (n and m), both strictly below 10, and generates matrix (2d array) of size n x m (respectively horizonal and vertical sizes). Contents of matrix should consist of sequential numbers from 0 to ((n * m) – 1), aligned in “spiral”. Example for 5 x 5 matrix :</a:t>
-            </a:r>
-            <a:endParaRPr lang="lv-LV" dirty="0"/>
-          </a:p>
-          <a:p>
-            <a:pPr marL="129899" indent="0">
-              <a:buNone/>
-            </a:pPr>
-            <a:endParaRPr lang="lv-LV" dirty="0"/>
-          </a:p>
-          <a:p>
-            <a:pPr marL="129899" indent="0">
-              <a:buNone/>
-            </a:pPr>
-            <a:r>
-              <a:rPr lang="en-US" dirty="0"/>
-              <a:t> </a:t>
+              <a:t>Create class named </a:t>
             </a:r>
             <a:r>
-              <a:rPr lang="lv-LV" dirty="0"/>
-              <a:t> </a:t>
+              <a:rPr lang="en-US" dirty="0" err="1"/>
+              <a:t>AwesomeList</a:t>
             </a:r>
             <a:r>
               <a:rPr lang="en-US" dirty="0"/>
-              <a:t>0  </a:t>
-            </a:r>
-            <a:r>
-              <a:rPr lang="lv-LV" dirty="0"/>
-              <a:t> </a:t>
-            </a:r>
-            <a:r>
-              <a:rPr lang="en-US" dirty="0"/>
-              <a:t>1  </a:t>
-            </a:r>
-            <a:r>
-              <a:rPr lang="lv-LV" dirty="0"/>
-              <a:t>  </a:t>
-            </a:r>
-            <a:r>
-              <a:rPr lang="en-US" dirty="0"/>
-              <a:t>2  </a:t>
-            </a:r>
-            <a:r>
-              <a:rPr lang="lv-LV" dirty="0"/>
-              <a:t> </a:t>
-            </a:r>
-            <a:r>
-              <a:rPr lang="en-US" dirty="0"/>
-              <a:t>3  4 </a:t>
+              <a:t>, that acts like a usual Java collection List implementation, and can do following things (only with integers) : </a:t>
             </a:r>
           </a:p>
           <a:p>
             <a:pPr marL="129899" indent="0">
               <a:buNone/>
             </a:pPr>
+            <a:endParaRPr lang="en-US" dirty="0"/>
+          </a:p>
+          <a:p>
+            <a:pPr marL="472799" indent="-342900">
+              <a:buFont typeface="+mj-lt"/>
+              <a:buAutoNum type="arabicPeriod"/>
+            </a:pPr>
             <a:r>
               <a:rPr lang="en-US" dirty="0"/>
-              <a:t>15 16 17 18  5 </a:t>
+              <a:t>add(&lt;n&gt;)  - adds &lt;n&gt; (n – simple int number) to list</a:t>
             </a:r>
           </a:p>
           <a:p>
-            <a:pPr marL="129899" indent="0">
-              <a:buNone/>
+            <a:pPr marL="472799" indent="-342900">
+              <a:buFont typeface="+mj-lt"/>
+              <a:buAutoNum type="arabicPeriod"/>
             </a:pPr>
             <a:r>
               <a:rPr lang="en-US" dirty="0"/>
-              <a:t>14 23 24 19  6 </a:t>
+              <a:t>get(&lt;</a:t>
+            </a:r>
+            <a:r>
+              <a:rPr lang="en-US" dirty="0" err="1"/>
+              <a:t>i</a:t>
+            </a:r>
+            <a:r>
+              <a:rPr lang="en-US" dirty="0"/>
+              <a:t>&gt;) – returns stored value by index &lt;</a:t>
+            </a:r>
+            <a:r>
+              <a:rPr lang="en-US" dirty="0" err="1"/>
+              <a:t>i</a:t>
+            </a:r>
+            <a:r>
+              <a:rPr lang="en-US" dirty="0"/>
+              <a:t>&gt;</a:t>
             </a:r>
           </a:p>
           <a:p>
-            <a:pPr marL="129899" indent="0">
-              <a:buNone/>
+            <a:pPr marL="472799" indent="-342900">
+              <a:buFont typeface="+mj-lt"/>
+              <a:buAutoNum type="arabicPeriod"/>
+            </a:pPr>
+            <a:r>
+              <a:rPr lang="en-US" dirty="0" err="1"/>
+              <a:t>printSelf</a:t>
+            </a:r>
+            <a:r>
+              <a:rPr lang="en-US" dirty="0"/>
+              <a:t>() – prints stored content</a:t>
+            </a:r>
+          </a:p>
+          <a:p>
+            <a:pPr marL="472799" indent="-342900">
+              <a:buFont typeface="+mj-lt"/>
+              <a:buAutoNum type="arabicPeriod"/>
             </a:pPr>
             <a:r>
               <a:rPr lang="en-US" dirty="0"/>
-              <a:t>13 22 21 20  7 </a:t>
+              <a:t>Bonus : </a:t>
             </a:r>
           </a:p>
           <a:p>
-            <a:pPr marL="129899" indent="0">
-              <a:buNone/>
+            <a:pPr marL="929999" lvl="1" indent="-342900">
+              <a:buFont typeface="+mj-lt"/>
+              <a:buAutoNum type="arabicPeriod"/>
             </a:pPr>
             <a:r>
               <a:rPr lang="en-US" dirty="0"/>
-              <a:t>12 11 10  9  </a:t>
+              <a:t>remove(&lt;</a:t>
             </a:r>
             <a:r>
-              <a:rPr lang="lv-LV" dirty="0"/>
-              <a:t> </a:t>
+              <a:rPr lang="en-US" dirty="0" err="1"/>
+              <a:t>i</a:t>
             </a:r>
             <a:r>
               <a:rPr lang="en-US" dirty="0"/>
-              <a:t>8</a:t>
+              <a:t>&gt;) – removes element by index &lt;</a:t>
             </a:r>
-            <a:endParaRPr lang="lv-LV" dirty="0"/>
+            <a:r>
+              <a:rPr lang="en-US" dirty="0" err="1"/>
+              <a:t>i</a:t>
+            </a:r>
+            <a:r>
+              <a:rPr lang="en-US" dirty="0"/>
+              <a:t>&gt;</a:t>
+            </a:r>
           </a:p>
           <a:p>
-            <a:pPr marL="129899" indent="0">
-              <a:buNone/>
+            <a:pPr marL="929999" lvl="1" indent="-342900">
+              <a:buFont typeface="+mj-lt"/>
+              <a:buAutoNum type="arabicPeriod"/>
             </a:pPr>
-            <a:endParaRPr lang="lv-LV" dirty="0"/>
+            <a:r>
+              <a:rPr lang="en-US" dirty="0" err="1"/>
+              <a:t>addAll</a:t>
+            </a:r>
+            <a:r>
+              <a:rPr lang="en-US" dirty="0"/>
+              <a:t>(&lt;&gt;) – adds all elements from given collection, where collection may be:</a:t>
+            </a:r>
           </a:p>
           <a:p>
-            <a:pPr marL="129899" indent="0">
-              <a:buNone/>
+            <a:pPr marL="1387199" lvl="2" indent="-342900">
+              <a:buFont typeface="+mj-lt"/>
+              <a:buAutoNum type="arabicPeriod"/>
             </a:pPr>
-            <a:endParaRPr lang="lv-LV" dirty="0"/>
+            <a:r>
+              <a:rPr lang="en-US" dirty="0"/>
+              <a:t>Another </a:t>
+            </a:r>
+            <a:r>
+              <a:rPr lang="en-US" dirty="0" err="1"/>
+              <a:t>AwesomeList</a:t>
+            </a:r>
+            <a:r>
+              <a:rPr lang="en-US" dirty="0"/>
+              <a:t> instance</a:t>
+            </a:r>
           </a:p>
           <a:p>
-            <a:pPr marL="129899" indent="0">
-              <a:buNone/>
+            <a:pPr marL="1387199" lvl="2" indent="-342900">
+              <a:buFont typeface="+mj-lt"/>
+              <a:buAutoNum type="arabicPeriod"/>
             </a:pPr>
-            <a:endParaRPr lang="lv-LV" dirty="0"/>
+            <a:r>
+              <a:rPr lang="en-US" dirty="0"/>
+              <a:t>int[]</a:t>
+            </a:r>
           </a:p>
           <a:p>
-            <a:pPr marL="129899" indent="0">
-              <a:buNone/>
+            <a:pPr marL="929999" lvl="1" indent="-342900">
+              <a:buFont typeface="+mj-lt"/>
+              <a:buAutoNum type="arabicPeriod"/>
             </a:pPr>
             <a:r>
-              <a:rPr lang="lv-LV" i="1" dirty="0"/>
-              <a:t>Hint</a:t>
+              <a:rPr lang="en-US" dirty="0" err="1"/>
+              <a:t>sortAsc</a:t>
             </a:r>
             <a:r>
-              <a:rPr lang="lv-LV" dirty="0"/>
-              <a:t> : for rounding up a floating numer, e.g. 2.5 -&gt; 3, use </a:t>
+              <a:rPr lang="en-US" dirty="0"/>
+              <a:t>() – sorts array in ascending order</a:t>
+            </a:r>
+          </a:p>
+          <a:p>
+            <a:pPr marL="929999" lvl="1" indent="-342900">
+              <a:buFont typeface="+mj-lt"/>
+              <a:buAutoNum type="arabicPeriod"/>
+            </a:pPr>
+            <a:r>
+              <a:rPr lang="en-US" dirty="0" err="1"/>
+              <a:t>sortDesc</a:t>
             </a:r>
             <a:r>
-              <a:rPr lang="lv-LV" b="1" dirty="0"/>
-              <a:t>Math.ceil(</a:t>
+              <a:rPr lang="en-US" dirty="0"/>
+              <a:t>() – sorts array in descending order</a:t>
             </a:r>
-            <a:r>
-              <a:rPr lang="lv-LV" dirty="0"/>
-              <a:t> 2.5 </a:t>
-            </a:r>
-            <a:r>
-              <a:rPr lang="lv-LV" b="1" dirty="0"/>
-              <a:t>)</a:t>
-            </a:r>
-            <a:endParaRPr lang="en-US" b="1" dirty="0"/>
           </a:p>
         </p:txBody>
       </p:sp>
-      <p:pic>
-        <p:nvPicPr>
-          <p:cNvPr id="5" name="Рисунок 4">
-            <a:extLst>
-              <a:ext uri="{FF2B5EF4-FFF2-40B4-BE49-F238E27FC236}">
-                <a16:creationId xmlns:a16="http://schemas.microsoft.com/office/drawing/2014/main" id="{4A35BD3B-1692-4801-8E25-C26F6D1D9D8C}"/>
-              </a:ext>
-            </a:extLst>
-          </p:cNvPr>
-          <p:cNvPicPr>
-            <a:picLocks noChangeAspect="1"/>
-          </p:cNvPicPr>
-          <p:nvPr/>
-        </p:nvPicPr>
-        <p:blipFill>
-          <a:blip r:embed="rId2"/>
-          <a:stretch>
-            <a:fillRect/>
-          </a:stretch>
-        </p:blipFill>
-        <p:spPr>
-          <a:xfrm>
-            <a:off x="2182607" y="2374709"/>
-            <a:ext cx="1844200" cy="1684166"/>
-          </a:xfrm>
-          <a:prstGeom prst="rect">
-            <a:avLst/>
-          </a:prstGeom>
-        </p:spPr>
-      </p:pic>
     </p:spTree>
     <p:extLst>
       <p:ext uri="{BB962C8B-B14F-4D97-AF65-F5344CB8AC3E}">
-        <p14:creationId xmlns:p14="http://schemas.microsoft.com/office/powerpoint/2010/main" val="2266669232"/>
+        <p14:creationId xmlns:p14="http://schemas.microsoft.com/office/powerpoint/2010/main" val="3227758319"/>
       </p:ext>
     </p:extLst>
   </p:cSld>

</xml_diff>

<commit_message>
Adjusted homework file (Task 12)
</commit_message>
<xml_diff>
--- a/Java Homework 02 (eng).pptx
+++ b/Java Homework 02 (eng).pptx
@@ -28568,7 +28568,12 @@
             <p:ph type="body" idx="1"/>
           </p:nvPr>
         </p:nvSpPr>
-        <p:spPr/>
+        <p:spPr>
+          <a:xfrm>
+            <a:off x="311700" y="1152475"/>
+            <a:ext cx="8520600" cy="3823562"/>
+          </a:xfrm>
+        </p:spPr>
         <p:txBody>
           <a:bodyPr/>
           <a:lstStyle/>
@@ -28732,12 +28737,16 @@
               <a:buAutoNum type="arabicPeriod"/>
             </a:pPr>
             <a:r>
+              <a:rPr lang="en-US" dirty="0"/>
+              <a:t>add(&lt;n&gt;, &lt;</a:t>
+            </a:r>
+            <a:r>
               <a:rPr lang="en-US" dirty="0" err="1"/>
-              <a:t>sortAsc</a:t>
+              <a:t>i</a:t>
             </a:r>
             <a:r>
               <a:rPr lang="en-US" dirty="0"/>
-              <a:t>() – sorts array in ascending order</a:t>
+              <a:t>&gt;) – adds element at specified index</a:t>
             </a:r>
           </a:p>
           <a:p>
@@ -28746,12 +28755,26 @@
               <a:buAutoNum type="arabicPeriod"/>
             </a:pPr>
             <a:r>
+              <a:rPr lang="en-US" dirty="0"/>
+              <a:t>size() – returns current stored content (number) count</a:t>
+            </a:r>
+          </a:p>
+          <a:p>
+            <a:pPr marL="929999" lvl="1" indent="-342900">
+              <a:buFont typeface="+mj-lt"/>
+              <a:buAutoNum type="arabicPeriod"/>
+            </a:pPr>
+            <a:r>
+              <a:rPr lang="en-US" dirty="0"/>
+              <a:t>equals(&lt;AL&gt;) – returns fact that comparing </a:t>
+            </a:r>
+            <a:r>
               <a:rPr lang="en-US" dirty="0" err="1"/>
-              <a:t>sortDesc</a:t>
+              <a:t>AwesomeList</a:t>
             </a:r>
             <a:r>
               <a:rPr lang="en-US" dirty="0"/>
-              <a:t>() – sorts array in descending order</a:t>
+              <a:t> has same contents </a:t>
             </a:r>
           </a:p>
         </p:txBody>

</xml_diff>